<commit_message>
update report to reflect milestone 2
</commit_message>
<xml_diff>
--- a/report/gen-disc-figure.pptx
+++ b/report/gen-disc-figure.pptx
@@ -2,12 +2,12 @@
 <file path=ppt/presentation.xml><?xml version="1.0" encoding="utf-8"?>
 <p:presentation xmlns:a="http://schemas.openxmlformats.org/drawingml/2006/main" xmlns:r="http://schemas.openxmlformats.org/officeDocument/2006/relationships" xmlns:p="http://schemas.openxmlformats.org/presentationml/2006/main" saveSubsetFonts="1" autoCompressPictures="0">
   <p:sldMasterIdLst>
-    <p:sldMasterId id="2147483660" r:id="rId1"/>
+    <p:sldMasterId id="2147483672" r:id="rId1"/>
   </p:sldMasterIdLst>
   <p:sldIdLst>
     <p:sldId id="256" r:id="rId2"/>
   </p:sldIdLst>
-  <p:sldSz cx="12192000" cy="5029200"/>
+  <p:sldSz cx="7315200" cy="5029200"/>
   <p:notesSz cx="6858000" cy="9144000"/>
   <p:defaultTextStyle>
     <a:defPPr>
@@ -104,6 +104,11 @@
       </a:defRPr>
     </a:lvl9pPr>
   </p:defaultTextStyle>
+  <p:extLst>
+    <p:ext uri="{EFAFB233-063F-42B5-8137-9DF3F51BA10A}">
+      <p15:sldGuideLst xmlns:p15="http://schemas.microsoft.com/office/powerpoint/2012/main"/>
+    </p:ext>
+  </p:extLst>
 </p:presentation>
 </file>
 
@@ -136,8 +141,8 @@
         </p:nvSpPr>
         <p:spPr>
           <a:xfrm>
-            <a:off x="1524000" y="823066"/>
-            <a:ext cx="9144000" cy="1750907"/>
+            <a:off x="548640" y="823066"/>
+            <a:ext cx="6217920" cy="1750907"/>
           </a:xfrm>
         </p:spPr>
         <p:txBody>
@@ -168,8 +173,8 @@
         </p:nvSpPr>
         <p:spPr>
           <a:xfrm>
-            <a:off x="1524000" y="2641495"/>
-            <a:ext cx="9144000" cy="1214225"/>
+            <a:off x="914400" y="2641495"/>
+            <a:ext cx="5486400" cy="1214225"/>
           </a:xfrm>
         </p:spPr>
         <p:txBody>
@@ -238,7 +243,7 @@
           <a:p>
             <a:fld id="{97B41076-CB1D-A34A-BCF0-74CB5DEB95F1}" type="datetimeFigureOut">
               <a:rPr lang="en-US" smtClean="0"/>
-              <a:t>2/26/21</a:t>
+              <a:t>3/8/21</a:t>
             </a:fld>
             <a:endParaRPr lang="en-US"/>
           </a:p>
@@ -289,7 +294,7 @@
     </p:spTree>
     <p:extLst>
       <p:ext uri="{BB962C8B-B14F-4D97-AF65-F5344CB8AC3E}">
-        <p14:creationId xmlns:p14="http://schemas.microsoft.com/office/powerpoint/2010/main" val="1694051351"/>
+        <p14:creationId xmlns:p14="http://schemas.microsoft.com/office/powerpoint/2010/main" val="2395106709"/>
       </p:ext>
     </p:extLst>
   </p:cSld>
@@ -408,7 +413,7 @@
           <a:p>
             <a:fld id="{97B41076-CB1D-A34A-BCF0-74CB5DEB95F1}" type="datetimeFigureOut">
               <a:rPr lang="en-US" smtClean="0"/>
-              <a:t>2/26/21</a:t>
+              <a:t>3/8/21</a:t>
             </a:fld>
             <a:endParaRPr lang="en-US"/>
           </a:p>
@@ -459,7 +464,7 @@
     </p:spTree>
     <p:extLst>
       <p:ext uri="{BB962C8B-B14F-4D97-AF65-F5344CB8AC3E}">
-        <p14:creationId xmlns:p14="http://schemas.microsoft.com/office/powerpoint/2010/main" val="1680468749"/>
+        <p14:creationId xmlns:p14="http://schemas.microsoft.com/office/powerpoint/2010/main" val="1355413850"/>
       </p:ext>
     </p:extLst>
   </p:cSld>
@@ -498,8 +503,8 @@
         </p:nvSpPr>
         <p:spPr>
           <a:xfrm>
-            <a:off x="8724900" y="267758"/>
-            <a:ext cx="2628900" cy="4262015"/>
+            <a:off x="5234940" y="267758"/>
+            <a:ext cx="1577340" cy="4262015"/>
           </a:xfrm>
         </p:spPr>
         <p:txBody>
@@ -526,8 +531,8 @@
         </p:nvSpPr>
         <p:spPr>
           <a:xfrm>
-            <a:off x="838200" y="267758"/>
-            <a:ext cx="7734300" cy="4262015"/>
+            <a:off x="502920" y="267758"/>
+            <a:ext cx="4640580" cy="4262015"/>
           </a:xfrm>
         </p:spPr>
         <p:txBody>
@@ -588,7 +593,7 @@
           <a:p>
             <a:fld id="{97B41076-CB1D-A34A-BCF0-74CB5DEB95F1}" type="datetimeFigureOut">
               <a:rPr lang="en-US" smtClean="0"/>
-              <a:t>2/26/21</a:t>
+              <a:t>3/8/21</a:t>
             </a:fld>
             <a:endParaRPr lang="en-US"/>
           </a:p>
@@ -639,7 +644,7 @@
     </p:spTree>
     <p:extLst>
       <p:ext uri="{BB962C8B-B14F-4D97-AF65-F5344CB8AC3E}">
-        <p14:creationId xmlns:p14="http://schemas.microsoft.com/office/powerpoint/2010/main" val="1869691597"/>
+        <p14:creationId xmlns:p14="http://schemas.microsoft.com/office/powerpoint/2010/main" val="2248922711"/>
       </p:ext>
     </p:extLst>
   </p:cSld>
@@ -758,7 +763,7 @@
           <a:p>
             <a:fld id="{97B41076-CB1D-A34A-BCF0-74CB5DEB95F1}" type="datetimeFigureOut">
               <a:rPr lang="en-US" smtClean="0"/>
-              <a:t>2/26/21</a:t>
+              <a:t>3/8/21</a:t>
             </a:fld>
             <a:endParaRPr lang="en-US"/>
           </a:p>
@@ -809,7 +814,7 @@
     </p:spTree>
     <p:extLst>
       <p:ext uri="{BB962C8B-B14F-4D97-AF65-F5344CB8AC3E}">
-        <p14:creationId xmlns:p14="http://schemas.microsoft.com/office/powerpoint/2010/main" val="2457004850"/>
+        <p14:creationId xmlns:p14="http://schemas.microsoft.com/office/powerpoint/2010/main" val="1643318291"/>
       </p:ext>
     </p:extLst>
   </p:cSld>
@@ -848,8 +853,8 @@
         </p:nvSpPr>
         <p:spPr>
           <a:xfrm>
-            <a:off x="831850" y="1253808"/>
-            <a:ext cx="10515600" cy="2092007"/>
+            <a:off x="499110" y="1253809"/>
+            <a:ext cx="6309360" cy="2092007"/>
           </a:xfrm>
         </p:spPr>
         <p:txBody>
@@ -880,8 +885,8 @@
         </p:nvSpPr>
         <p:spPr>
           <a:xfrm>
-            <a:off x="831850" y="3365607"/>
-            <a:ext cx="10515600" cy="1100137"/>
+            <a:off x="499110" y="3365607"/>
+            <a:ext cx="6309360" cy="1100137"/>
           </a:xfrm>
         </p:spPr>
         <p:txBody>
@@ -891,9 +896,7 @@
               <a:buNone/>
               <a:defRPr sz="1760">
                 <a:solidFill>
-                  <a:schemeClr val="tx1">
-                    <a:tint val="75000"/>
-                  </a:schemeClr>
+                  <a:schemeClr val="tx1"/>
                 </a:solidFill>
               </a:defRPr>
             </a:lvl1pPr>
@@ -1004,7 +1007,7 @@
           <a:p>
             <a:fld id="{97B41076-CB1D-A34A-BCF0-74CB5DEB95F1}" type="datetimeFigureOut">
               <a:rPr lang="en-US" smtClean="0"/>
-              <a:t>2/26/21</a:t>
+              <a:t>3/8/21</a:t>
             </a:fld>
             <a:endParaRPr lang="en-US"/>
           </a:p>
@@ -1055,7 +1058,7 @@
     </p:spTree>
     <p:extLst>
       <p:ext uri="{BB962C8B-B14F-4D97-AF65-F5344CB8AC3E}">
-        <p14:creationId xmlns:p14="http://schemas.microsoft.com/office/powerpoint/2010/main" val="1963312609"/>
+        <p14:creationId xmlns:p14="http://schemas.microsoft.com/office/powerpoint/2010/main" val="499639315"/>
       </p:ext>
     </p:extLst>
   </p:cSld>
@@ -1117,8 +1120,8 @@
         </p:nvSpPr>
         <p:spPr>
           <a:xfrm>
-            <a:off x="838200" y="1338792"/>
-            <a:ext cx="5181600" cy="3190981"/>
+            <a:off x="502920" y="1338792"/>
+            <a:ext cx="3108960" cy="3190981"/>
           </a:xfrm>
         </p:spPr>
         <p:txBody>
@@ -1174,8 +1177,8 @@
         </p:nvSpPr>
         <p:spPr>
           <a:xfrm>
-            <a:off x="6172200" y="1338792"/>
-            <a:ext cx="5181600" cy="3190981"/>
+            <a:off x="3703320" y="1338792"/>
+            <a:ext cx="3108960" cy="3190981"/>
           </a:xfrm>
         </p:spPr>
         <p:txBody>
@@ -1236,7 +1239,7 @@
           <a:p>
             <a:fld id="{97B41076-CB1D-A34A-BCF0-74CB5DEB95F1}" type="datetimeFigureOut">
               <a:rPr lang="en-US" smtClean="0"/>
-              <a:t>2/26/21</a:t>
+              <a:t>3/8/21</a:t>
             </a:fld>
             <a:endParaRPr lang="en-US"/>
           </a:p>
@@ -1287,7 +1290,7 @@
     </p:spTree>
     <p:extLst>
       <p:ext uri="{BB962C8B-B14F-4D97-AF65-F5344CB8AC3E}">
-        <p14:creationId xmlns:p14="http://schemas.microsoft.com/office/powerpoint/2010/main" val="995961235"/>
+        <p14:creationId xmlns:p14="http://schemas.microsoft.com/office/powerpoint/2010/main" val="2092649793"/>
       </p:ext>
     </p:extLst>
   </p:cSld>
@@ -1326,8 +1329,8 @@
         </p:nvSpPr>
         <p:spPr>
           <a:xfrm>
-            <a:off x="839788" y="267758"/>
-            <a:ext cx="10515600" cy="972080"/>
+            <a:off x="503873" y="267759"/>
+            <a:ext cx="6309360" cy="972080"/>
           </a:xfrm>
         </p:spPr>
         <p:txBody>
@@ -1354,8 +1357,8 @@
         </p:nvSpPr>
         <p:spPr>
           <a:xfrm>
-            <a:off x="839789" y="1232853"/>
-            <a:ext cx="5157787" cy="604202"/>
+            <a:off x="503874" y="1232853"/>
+            <a:ext cx="3094672" cy="604202"/>
           </a:xfrm>
         </p:spPr>
         <p:txBody>
@@ -1419,8 +1422,8 @@
         </p:nvSpPr>
         <p:spPr>
           <a:xfrm>
-            <a:off x="839789" y="1837055"/>
-            <a:ext cx="5157787" cy="2702031"/>
+            <a:off x="503874" y="1837055"/>
+            <a:ext cx="3094672" cy="2702031"/>
           </a:xfrm>
         </p:spPr>
         <p:txBody>
@@ -1476,8 +1479,8 @@
         </p:nvSpPr>
         <p:spPr>
           <a:xfrm>
-            <a:off x="6172200" y="1232853"/>
-            <a:ext cx="5183188" cy="604202"/>
+            <a:off x="3703320" y="1232853"/>
+            <a:ext cx="3109913" cy="604202"/>
           </a:xfrm>
         </p:spPr>
         <p:txBody>
@@ -1541,8 +1544,8 @@
         </p:nvSpPr>
         <p:spPr>
           <a:xfrm>
-            <a:off x="6172200" y="1837055"/>
-            <a:ext cx="5183188" cy="2702031"/>
+            <a:off x="3703320" y="1837055"/>
+            <a:ext cx="3109913" cy="2702031"/>
           </a:xfrm>
         </p:spPr>
         <p:txBody>
@@ -1603,7 +1606,7 @@
           <a:p>
             <a:fld id="{97B41076-CB1D-A34A-BCF0-74CB5DEB95F1}" type="datetimeFigureOut">
               <a:rPr lang="en-US" smtClean="0"/>
-              <a:t>2/26/21</a:t>
+              <a:t>3/8/21</a:t>
             </a:fld>
             <a:endParaRPr lang="en-US"/>
           </a:p>
@@ -1654,7 +1657,7 @@
     </p:spTree>
     <p:extLst>
       <p:ext uri="{BB962C8B-B14F-4D97-AF65-F5344CB8AC3E}">
-        <p14:creationId xmlns:p14="http://schemas.microsoft.com/office/powerpoint/2010/main" val="3497772056"/>
+        <p14:creationId xmlns:p14="http://schemas.microsoft.com/office/powerpoint/2010/main" val="2835887804"/>
       </p:ext>
     </p:extLst>
   </p:cSld>
@@ -1721,7 +1724,7 @@
           <a:p>
             <a:fld id="{97B41076-CB1D-A34A-BCF0-74CB5DEB95F1}" type="datetimeFigureOut">
               <a:rPr lang="en-US" smtClean="0"/>
-              <a:t>2/26/21</a:t>
+              <a:t>3/8/21</a:t>
             </a:fld>
             <a:endParaRPr lang="en-US"/>
           </a:p>
@@ -1772,7 +1775,7 @@
     </p:spTree>
     <p:extLst>
       <p:ext uri="{BB962C8B-B14F-4D97-AF65-F5344CB8AC3E}">
-        <p14:creationId xmlns:p14="http://schemas.microsoft.com/office/powerpoint/2010/main" val="2211977777"/>
+        <p14:creationId xmlns:p14="http://schemas.microsoft.com/office/powerpoint/2010/main" val="3835808369"/>
       </p:ext>
     </p:extLst>
   </p:cSld>
@@ -1816,7 +1819,7 @@
           <a:p>
             <a:fld id="{97B41076-CB1D-A34A-BCF0-74CB5DEB95F1}" type="datetimeFigureOut">
               <a:rPr lang="en-US" smtClean="0"/>
-              <a:t>2/26/21</a:t>
+              <a:t>3/8/21</a:t>
             </a:fld>
             <a:endParaRPr lang="en-US"/>
           </a:p>
@@ -1867,7 +1870,7 @@
     </p:spTree>
     <p:extLst>
       <p:ext uri="{BB962C8B-B14F-4D97-AF65-F5344CB8AC3E}">
-        <p14:creationId xmlns:p14="http://schemas.microsoft.com/office/powerpoint/2010/main" val="832794120"/>
+        <p14:creationId xmlns:p14="http://schemas.microsoft.com/office/powerpoint/2010/main" val="280545981"/>
       </p:ext>
     </p:extLst>
   </p:cSld>
@@ -1906,8 +1909,8 @@
         </p:nvSpPr>
         <p:spPr>
           <a:xfrm>
-            <a:off x="839789" y="335280"/>
-            <a:ext cx="3932237" cy="1173480"/>
+            <a:off x="503873" y="335280"/>
+            <a:ext cx="2359342" cy="1173480"/>
           </a:xfrm>
         </p:spPr>
         <p:txBody>
@@ -1938,8 +1941,8 @@
         </p:nvSpPr>
         <p:spPr>
           <a:xfrm>
-            <a:off x="5183188" y="724112"/>
-            <a:ext cx="6172200" cy="3573992"/>
+            <a:off x="3109913" y="724113"/>
+            <a:ext cx="3703320" cy="3573992"/>
           </a:xfrm>
         </p:spPr>
         <p:txBody>
@@ -2023,8 +2026,8 @@
         </p:nvSpPr>
         <p:spPr>
           <a:xfrm>
-            <a:off x="839789" y="1508760"/>
-            <a:ext cx="3932237" cy="2795165"/>
+            <a:off x="503873" y="1508760"/>
+            <a:ext cx="2359342" cy="2795165"/>
           </a:xfrm>
         </p:spPr>
         <p:txBody>
@@ -2093,7 +2096,7 @@
           <a:p>
             <a:fld id="{97B41076-CB1D-A34A-BCF0-74CB5DEB95F1}" type="datetimeFigureOut">
               <a:rPr lang="en-US" smtClean="0"/>
-              <a:t>2/26/21</a:t>
+              <a:t>3/8/21</a:t>
             </a:fld>
             <a:endParaRPr lang="en-US"/>
           </a:p>
@@ -2144,7 +2147,7 @@
     </p:spTree>
     <p:extLst>
       <p:ext uri="{BB962C8B-B14F-4D97-AF65-F5344CB8AC3E}">
-        <p14:creationId xmlns:p14="http://schemas.microsoft.com/office/powerpoint/2010/main" val="548250984"/>
+        <p14:creationId xmlns:p14="http://schemas.microsoft.com/office/powerpoint/2010/main" val="3191967284"/>
       </p:ext>
     </p:extLst>
   </p:cSld>
@@ -2183,8 +2186,8 @@
         </p:nvSpPr>
         <p:spPr>
           <a:xfrm>
-            <a:off x="839789" y="335280"/>
-            <a:ext cx="3932237" cy="1173480"/>
+            <a:off x="503873" y="335280"/>
+            <a:ext cx="2359342" cy="1173480"/>
           </a:xfrm>
         </p:spPr>
         <p:txBody>
@@ -2215,8 +2218,8 @@
         </p:nvSpPr>
         <p:spPr>
           <a:xfrm>
-            <a:off x="5183188" y="724112"/>
-            <a:ext cx="6172200" cy="3573992"/>
+            <a:off x="3109913" y="724113"/>
+            <a:ext cx="3703320" cy="3573992"/>
           </a:xfrm>
         </p:spPr>
         <p:txBody>
@@ -2280,8 +2283,8 @@
         </p:nvSpPr>
         <p:spPr>
           <a:xfrm>
-            <a:off x="839789" y="1508760"/>
-            <a:ext cx="3932237" cy="2795165"/>
+            <a:off x="503873" y="1508760"/>
+            <a:ext cx="2359342" cy="2795165"/>
           </a:xfrm>
         </p:spPr>
         <p:txBody>
@@ -2350,7 +2353,7 @@
           <a:p>
             <a:fld id="{97B41076-CB1D-A34A-BCF0-74CB5DEB95F1}" type="datetimeFigureOut">
               <a:rPr lang="en-US" smtClean="0"/>
-              <a:t>2/26/21</a:t>
+              <a:t>3/8/21</a:t>
             </a:fld>
             <a:endParaRPr lang="en-US"/>
           </a:p>
@@ -2401,7 +2404,7 @@
     </p:spTree>
     <p:extLst>
       <p:ext uri="{BB962C8B-B14F-4D97-AF65-F5344CB8AC3E}">
-        <p14:creationId xmlns:p14="http://schemas.microsoft.com/office/powerpoint/2010/main" val="1197327796"/>
+        <p14:creationId xmlns:p14="http://schemas.microsoft.com/office/powerpoint/2010/main" val="3785904545"/>
       </p:ext>
     </p:extLst>
   </p:cSld>
@@ -2445,8 +2448,8 @@
         </p:nvSpPr>
         <p:spPr>
           <a:xfrm>
-            <a:off x="838200" y="267758"/>
-            <a:ext cx="10515600" cy="972080"/>
+            <a:off x="502920" y="267759"/>
+            <a:ext cx="6309360" cy="972080"/>
           </a:xfrm>
           <a:prstGeom prst="rect">
             <a:avLst/>
@@ -2478,8 +2481,8 @@
         </p:nvSpPr>
         <p:spPr>
           <a:xfrm>
-            <a:off x="838200" y="1338792"/>
-            <a:ext cx="10515600" cy="3190981"/>
+            <a:off x="502920" y="1338792"/>
+            <a:ext cx="6309360" cy="3190981"/>
           </a:xfrm>
           <a:prstGeom prst="rect">
             <a:avLst/>
@@ -2540,8 +2543,8 @@
         </p:nvSpPr>
         <p:spPr>
           <a:xfrm>
-            <a:off x="838200" y="4661324"/>
-            <a:ext cx="2743200" cy="267758"/>
+            <a:off x="502920" y="4661325"/>
+            <a:ext cx="1645920" cy="267758"/>
           </a:xfrm>
           <a:prstGeom prst="rect">
             <a:avLst/>
@@ -2563,7 +2566,7 @@
           <a:p>
             <a:fld id="{97B41076-CB1D-A34A-BCF0-74CB5DEB95F1}" type="datetimeFigureOut">
               <a:rPr lang="en-US" smtClean="0"/>
-              <a:t>2/26/21</a:t>
+              <a:t>3/8/21</a:t>
             </a:fld>
             <a:endParaRPr lang="en-US"/>
           </a:p>
@@ -2581,8 +2584,8 @@
         </p:nvSpPr>
         <p:spPr>
           <a:xfrm>
-            <a:off x="4038600" y="4661324"/>
-            <a:ext cx="4114800" cy="267758"/>
+            <a:off x="2423160" y="4661325"/>
+            <a:ext cx="2468880" cy="267758"/>
           </a:xfrm>
           <a:prstGeom prst="rect">
             <a:avLst/>
@@ -2618,8 +2621,8 @@
         </p:nvSpPr>
         <p:spPr>
           <a:xfrm>
-            <a:off x="8610600" y="4661324"/>
-            <a:ext cx="2743200" cy="267758"/>
+            <a:off x="5166360" y="4661325"/>
+            <a:ext cx="1645920" cy="267758"/>
           </a:xfrm>
           <a:prstGeom prst="rect">
             <a:avLst/>
@@ -2650,23 +2653,23 @@
     </p:spTree>
     <p:extLst>
       <p:ext uri="{BB962C8B-B14F-4D97-AF65-F5344CB8AC3E}">
-        <p14:creationId xmlns:p14="http://schemas.microsoft.com/office/powerpoint/2010/main" val="1288240972"/>
+        <p14:creationId xmlns:p14="http://schemas.microsoft.com/office/powerpoint/2010/main" val="3477198327"/>
       </p:ext>
     </p:extLst>
   </p:cSld>
   <p:clrMap bg1="lt1" tx1="dk1" bg2="lt2" tx2="dk2" accent1="accent1" accent2="accent2" accent3="accent3" accent4="accent4" accent5="accent5" accent6="accent6" hlink="hlink" folHlink="folHlink"/>
   <p:sldLayoutIdLst>
-    <p:sldLayoutId id="2147483661" r:id="rId1"/>
-    <p:sldLayoutId id="2147483662" r:id="rId2"/>
-    <p:sldLayoutId id="2147483663" r:id="rId3"/>
-    <p:sldLayoutId id="2147483664" r:id="rId4"/>
-    <p:sldLayoutId id="2147483665" r:id="rId5"/>
-    <p:sldLayoutId id="2147483666" r:id="rId6"/>
-    <p:sldLayoutId id="2147483667" r:id="rId7"/>
-    <p:sldLayoutId id="2147483668" r:id="rId8"/>
-    <p:sldLayoutId id="2147483669" r:id="rId9"/>
-    <p:sldLayoutId id="2147483670" r:id="rId10"/>
-    <p:sldLayoutId id="2147483671" r:id="rId11"/>
+    <p:sldLayoutId id="2147483673" r:id="rId1"/>
+    <p:sldLayoutId id="2147483674" r:id="rId2"/>
+    <p:sldLayoutId id="2147483675" r:id="rId3"/>
+    <p:sldLayoutId id="2147483676" r:id="rId4"/>
+    <p:sldLayoutId id="2147483677" r:id="rId5"/>
+    <p:sldLayoutId id="2147483678" r:id="rId6"/>
+    <p:sldLayoutId id="2147483679" r:id="rId7"/>
+    <p:sldLayoutId id="2147483680" r:id="rId8"/>
+    <p:sldLayoutId id="2147483681" r:id="rId9"/>
+    <p:sldLayoutId id="2147483682" r:id="rId10"/>
+    <p:sldLayoutId id="2147483683" r:id="rId11"/>
   </p:sldLayoutIdLst>
   <p:txStyles>
     <p:titleStyle>
@@ -2982,7 +2985,7 @@
         </p:nvSpPr>
         <p:spPr>
           <a:xfrm>
-            <a:off x="3176666" y="3113315"/>
+            <a:off x="738266" y="3113316"/>
             <a:ext cx="2438400" cy="827315"/>
           </a:xfrm>
           <a:prstGeom prst="rect">
@@ -3029,7 +3032,7 @@
         </p:nvSpPr>
         <p:spPr>
           <a:xfrm>
-            <a:off x="6192187" y="3113314"/>
+            <a:off x="3753787" y="3113315"/>
             <a:ext cx="2438400" cy="827315"/>
           </a:xfrm>
           <a:prstGeom prst="rect">
@@ -3062,8 +3065,8 @@
           </a:p>
         </p:txBody>
       </p:sp>
-      <mc:AlternateContent xmlns:mc="http://schemas.openxmlformats.org/markup-compatibility/2006">
-        <mc:Choice xmlns:a14="http://schemas.microsoft.com/office/drawing/2010/main" Requires="a14">
+      <mc:AlternateContent xmlns:mc="http://schemas.openxmlformats.org/markup-compatibility/2006" xmlns:a14="http://schemas.microsoft.com/office/drawing/2010/main">
+        <mc:Choice Requires="a14">
           <p:sp>
             <p:nvSpPr>
               <p:cNvPr id="7" name="TextBox 6">
@@ -3078,7 +3081,7 @@
             </p:nvSpPr>
             <p:spPr>
               <a:xfrm>
-                <a:off x="3364667" y="4377126"/>
+                <a:off x="926268" y="4377127"/>
                 <a:ext cx="2062397" cy="389337"/>
               </a:xfrm>
               <a:prstGeom prst="rect">
@@ -3095,7 +3098,7 @@
                 <a14:m>
                   <m:oMath xmlns:m="http://schemas.openxmlformats.org/officeDocument/2006/math">
                     <m:r>
-                      <a:rPr lang="en-US" b="0" i="1" smtClean="0">
+                      <a:rPr lang="en-US" i="1">
                         <a:latin typeface="Cambria Math" panose="02040503050406030204" pitchFamily="18" charset="0"/>
                       </a:rPr>
                       <m:t>….</m:t>
@@ -3103,14 +3106,14 @@
                     <m:sSub>
                       <m:sSubPr>
                         <m:ctrlPr>
-                          <a:rPr lang="en-US" b="0" i="1" smtClean="0">
+                          <a:rPr lang="en-US" i="1">
                             <a:latin typeface="Cambria Math" panose="02040503050406030204" pitchFamily="18" charset="0"/>
                           </a:rPr>
                         </m:ctrlPr>
                       </m:sSubPr>
                       <m:e>
                         <m:r>
-                          <a:rPr lang="en-US" b="0" i="1" smtClean="0">
+                          <a:rPr lang="en-US" i="1">
                             <a:latin typeface="Cambria Math" panose="02040503050406030204" pitchFamily="18" charset="0"/>
                           </a:rPr>
                           <m:t>𝑥</m:t>
@@ -3122,20 +3125,20 @@
                             <m:begChr m:val="{"/>
                             <m:endChr m:val="}"/>
                             <m:ctrlPr>
-                              <a:rPr lang="en-US" b="0" i="1" smtClean="0">
+                              <a:rPr lang="en-US" i="1">
                                 <a:latin typeface="Cambria Math" panose="02040503050406030204" pitchFamily="18" charset="0"/>
                               </a:rPr>
                             </m:ctrlPr>
                           </m:dPr>
                           <m:e>
                             <m:r>
-                              <a:rPr lang="en-US" b="0" i="1" smtClean="0">
+                              <a:rPr lang="en-US" i="1">
                                 <a:latin typeface="Cambria Math" panose="02040503050406030204" pitchFamily="18" charset="0"/>
                               </a:rPr>
                               <m:t>𝑖</m:t>
                             </m:r>
                             <m:r>
-                              <a:rPr lang="en-US" b="0" i="1" smtClean="0">
+                              <a:rPr lang="en-US" i="1">
                                 <a:latin typeface="Cambria Math" panose="02040503050406030204" pitchFamily="18" charset="0"/>
                               </a:rPr>
                               <m:t>−2</m:t>
@@ -3145,7 +3148,7 @@
                       </m:sub>
                     </m:sSub>
                     <m:r>
-                      <a:rPr lang="en-US" b="0" i="1" smtClean="0">
+                      <a:rPr lang="en-US" i="1">
                         <a:latin typeface="Cambria Math" panose="02040503050406030204" pitchFamily="18" charset="0"/>
                       </a:rPr>
                       <m:t>  </m:t>
@@ -3153,14 +3156,14 @@
                     <m:sSub>
                       <m:sSubPr>
                         <m:ctrlPr>
-                          <a:rPr lang="en-US" b="0" i="1" smtClean="0">
+                          <a:rPr lang="en-US" i="1">
                             <a:latin typeface="Cambria Math" panose="02040503050406030204" pitchFamily="18" charset="0"/>
                           </a:rPr>
                         </m:ctrlPr>
                       </m:sSubPr>
                       <m:e>
                         <m:r>
-                          <a:rPr lang="en-US" b="0" i="1" smtClean="0">
+                          <a:rPr lang="en-US" i="1">
                             <a:latin typeface="Cambria Math" panose="02040503050406030204" pitchFamily="18" charset="0"/>
                           </a:rPr>
                           <m:t>𝑥</m:t>
@@ -3172,20 +3175,20 @@
                             <m:begChr m:val="{"/>
                             <m:endChr m:val="}"/>
                             <m:ctrlPr>
-                              <a:rPr lang="en-US" b="0" i="1" smtClean="0">
+                              <a:rPr lang="en-US" i="1">
                                 <a:latin typeface="Cambria Math" panose="02040503050406030204" pitchFamily="18" charset="0"/>
                               </a:rPr>
                             </m:ctrlPr>
                           </m:dPr>
                           <m:e>
                             <m:r>
-                              <a:rPr lang="en-US" b="0" i="1" smtClean="0">
+                              <a:rPr lang="en-US" i="1">
                                 <a:latin typeface="Cambria Math" panose="02040503050406030204" pitchFamily="18" charset="0"/>
                               </a:rPr>
                               <m:t>𝑖</m:t>
                             </m:r>
                             <m:r>
-                              <a:rPr lang="en-US" b="0" i="1" smtClean="0">
+                              <a:rPr lang="en-US" i="1">
                                 <a:latin typeface="Cambria Math" panose="02040503050406030204" pitchFamily="18" charset="0"/>
                               </a:rPr>
                               <m:t>−1</m:t>
@@ -3195,7 +3198,7 @@
                       </m:sub>
                     </m:sSub>
                     <m:r>
-                      <a:rPr lang="en-US" b="0" i="1" smtClean="0">
+                      <a:rPr lang="en-US" i="1">
                         <a:latin typeface="Cambria Math" panose="02040503050406030204" pitchFamily="18" charset="0"/>
                       </a:rPr>
                       <m:t>  </m:t>
@@ -3203,14 +3206,14 @@
                     <m:sSub>
                       <m:sSubPr>
                         <m:ctrlPr>
-                          <a:rPr lang="en-US" b="0" i="1" smtClean="0">
+                          <a:rPr lang="en-US" i="1">
                             <a:latin typeface="Cambria Math" panose="02040503050406030204" pitchFamily="18" charset="0"/>
                           </a:rPr>
                         </m:ctrlPr>
                       </m:sSubPr>
                       <m:e>
                         <m:r>
-                          <a:rPr lang="en-US" b="0" i="1" smtClean="0">
+                          <a:rPr lang="en-US" i="1">
                             <a:latin typeface="Cambria Math" panose="02040503050406030204" pitchFamily="18" charset="0"/>
                           </a:rPr>
                           <m:t>𝑥</m:t>
@@ -3222,14 +3225,14 @@
                             <m:begChr m:val="{"/>
                             <m:endChr m:val="}"/>
                             <m:ctrlPr>
-                              <a:rPr lang="en-US" b="0" i="1" smtClean="0">
+                              <a:rPr lang="en-US" i="1">
                                 <a:latin typeface="Cambria Math" panose="02040503050406030204" pitchFamily="18" charset="0"/>
                               </a:rPr>
                             </m:ctrlPr>
                           </m:dPr>
                           <m:e>
                             <m:r>
-                              <a:rPr lang="en-US" b="0" i="1" smtClean="0">
+                              <a:rPr lang="en-US" i="1">
                                 <a:latin typeface="Cambria Math" panose="02040503050406030204" pitchFamily="18" charset="0"/>
                               </a:rPr>
                               <m:t>𝑖</m:t>
@@ -3241,14 +3244,14 @@
                   </m:oMath>
                 </a14:m>
                 <a:r>
-                  <a:rPr lang="en-US" b="0" dirty="0"/>
+                  <a:rPr lang="en-US" dirty="0"/>
                   <a:t> </a:t>
                 </a:r>
               </a:p>
             </p:txBody>
           </p:sp>
         </mc:Choice>
-        <mc:Fallback>
+        <mc:Fallback xmlns="">
           <p:sp>
             <p:nvSpPr>
               <p:cNvPr id="7" name="TextBox 6">
@@ -3265,7 +3268,7 @@
             </p:nvSpPr>
             <p:spPr>
               <a:xfrm>
-                <a:off x="3364667" y="4377126"/>
+                <a:off x="926268" y="4377127"/>
                 <a:ext cx="2062397" cy="389337"/>
               </a:xfrm>
               <a:prstGeom prst="rect">
@@ -3307,7 +3310,7 @@
         </p:nvSpPr>
         <p:spPr>
           <a:xfrm>
-            <a:off x="4991723" y="3968418"/>
+            <a:off x="2553324" y="3968419"/>
             <a:ext cx="286687" cy="436497"/>
           </a:xfrm>
           <a:prstGeom prst="triangle">
@@ -3354,7 +3357,7 @@
         </p:nvSpPr>
         <p:spPr>
           <a:xfrm>
-            <a:off x="4410229" y="4008669"/>
+            <a:off x="1971830" y="4008670"/>
             <a:ext cx="286687" cy="436497"/>
           </a:xfrm>
           <a:prstGeom prst="triangle">
@@ -3401,7 +3404,7 @@
         </p:nvSpPr>
         <p:spPr>
           <a:xfrm>
-            <a:off x="3828735" y="4008669"/>
+            <a:off x="1390336" y="4008670"/>
             <a:ext cx="286687" cy="436497"/>
           </a:xfrm>
           <a:prstGeom prst="triangle">
@@ -3448,7 +3451,7 @@
         </p:nvSpPr>
         <p:spPr>
           <a:xfrm>
-            <a:off x="5655038" y="4404915"/>
+            <a:off x="3216639" y="4404916"/>
             <a:ext cx="286687" cy="389337"/>
           </a:xfrm>
           <a:prstGeom prst="ellipse">
@@ -3500,7 +3503,7 @@
         </p:nvCxnSpPr>
         <p:spPr>
           <a:xfrm rot="16200000" flipH="1">
-            <a:off x="5087197" y="2421983"/>
+            <a:off x="2648798" y="2421984"/>
             <a:ext cx="413657" cy="1796321"/>
           </a:xfrm>
           <a:prstGeom prst="bentConnector4">
@@ -3544,8 +3547,8 @@
             </p:nvSpPr>
             <p:spPr>
               <a:xfrm>
-                <a:off x="6132226" y="4377125"/>
-                <a:ext cx="2062397" cy="389337"/>
+                <a:off x="3766016" y="4385147"/>
+                <a:ext cx="2062397" cy="369332"/>
               </a:xfrm>
               <a:prstGeom prst="rect">
                 <a:avLst/>
@@ -3560,160 +3563,28 @@
               <a:p>
                 <a14:m>
                   <m:oMath xmlns:m="http://schemas.openxmlformats.org/officeDocument/2006/math">
-                    <m:sSub>
-                      <m:sSubPr>
-                        <m:ctrlPr>
-                          <a:rPr lang="en-US" b="0" i="1" smtClean="0">
-                            <a:latin typeface="Cambria Math" panose="02040503050406030204" pitchFamily="18" charset="0"/>
-                          </a:rPr>
-                        </m:ctrlPr>
-                      </m:sSubPr>
-                      <m:e>
-                        <m:r>
-                          <a:rPr lang="en-US" b="0" i="1" smtClean="0">
-                            <a:latin typeface="Cambria Math" panose="02040503050406030204" pitchFamily="18" charset="0"/>
-                          </a:rPr>
-                          <m:t>𝑥</m:t>
-                        </m:r>
-                      </m:e>
-                      <m:sub>
-                        <m:d>
-                          <m:dPr>
-                            <m:begChr m:val="{"/>
-                            <m:endChr m:val="}"/>
-                            <m:ctrlPr>
-                              <a:rPr lang="en-US" b="0" i="1" smtClean="0">
-                                <a:latin typeface="Cambria Math" panose="02040503050406030204" pitchFamily="18" charset="0"/>
-                              </a:rPr>
-                            </m:ctrlPr>
-                          </m:dPr>
-                          <m:e>
-                            <m:r>
-                              <a:rPr lang="en-US" b="0" i="1" smtClean="0">
-                                <a:latin typeface="Cambria Math" panose="02040503050406030204" pitchFamily="18" charset="0"/>
-                              </a:rPr>
-                              <m:t>𝑖</m:t>
-                            </m:r>
-                            <m:r>
-                              <a:rPr lang="en-US" b="0" i="1" smtClean="0">
-                                <a:latin typeface="Cambria Math" panose="02040503050406030204" pitchFamily="18" charset="0"/>
-                              </a:rPr>
-                              <m:t>+1</m:t>
-                            </m:r>
-                          </m:e>
-                        </m:d>
-                      </m:sub>
-                    </m:sSub>
                     <m:r>
                       <a:rPr lang="en-US" b="0" i="1" smtClean="0">
                         <a:latin typeface="Cambria Math" panose="02040503050406030204" pitchFamily="18" charset="0"/>
                       </a:rPr>
-                      <m:t>  </m:t>
+                      <m:t>𝑧</m:t>
                     </m:r>
-                    <m:sSub>
-                      <m:sSubPr>
-                        <m:ctrlPr>
-                          <a:rPr lang="en-US" b="0" i="1" smtClean="0">
-                            <a:latin typeface="Cambria Math" panose="02040503050406030204" pitchFamily="18" charset="0"/>
-                          </a:rPr>
-                        </m:ctrlPr>
-                      </m:sSubPr>
-                      <m:e>
-                        <m:r>
-                          <a:rPr lang="en-US" b="0" i="1" smtClean="0">
-                            <a:latin typeface="Cambria Math" panose="02040503050406030204" pitchFamily="18" charset="0"/>
-                          </a:rPr>
-                          <m:t>𝑥</m:t>
-                        </m:r>
-                      </m:e>
-                      <m:sub>
-                        <m:d>
-                          <m:dPr>
-                            <m:begChr m:val="{"/>
-                            <m:endChr m:val="}"/>
-                            <m:ctrlPr>
-                              <a:rPr lang="en-US" b="0" i="1" smtClean="0">
-                                <a:latin typeface="Cambria Math" panose="02040503050406030204" pitchFamily="18" charset="0"/>
-                              </a:rPr>
-                            </m:ctrlPr>
-                          </m:dPr>
-                          <m:e>
-                            <m:r>
-                              <a:rPr lang="en-US" b="0" i="1" smtClean="0">
-                                <a:latin typeface="Cambria Math" panose="02040503050406030204" pitchFamily="18" charset="0"/>
-                              </a:rPr>
-                              <m:t>𝑖</m:t>
-                            </m:r>
-                            <m:r>
-                              <a:rPr lang="en-US" b="0" i="1" smtClean="0">
-                                <a:latin typeface="Cambria Math" panose="02040503050406030204" pitchFamily="18" charset="0"/>
-                              </a:rPr>
-                              <m:t>+2</m:t>
-                            </m:r>
-                          </m:e>
-                        </m:d>
-                      </m:sub>
-                    </m:sSub>
                     <m:r>
                       <a:rPr lang="en-US" b="0" i="1" smtClean="0">
                         <a:latin typeface="Cambria Math" panose="02040503050406030204" pitchFamily="18" charset="0"/>
                       </a:rPr>
-                      <m:t>  </m:t>
+                      <m:t>~</m:t>
                     </m:r>
-                    <m:sSub>
-                      <m:sSubPr>
-                        <m:ctrlPr>
-                          <a:rPr lang="en-US" b="0" i="1" smtClean="0">
-                            <a:latin typeface="Cambria Math" panose="02040503050406030204" pitchFamily="18" charset="0"/>
-                          </a:rPr>
-                        </m:ctrlPr>
-                      </m:sSubPr>
-                      <m:e>
-                        <m:r>
-                          <a:rPr lang="en-US" b="0" i="1" smtClean="0">
-                            <a:latin typeface="Cambria Math" panose="02040503050406030204" pitchFamily="18" charset="0"/>
-                          </a:rPr>
-                          <m:t>𝑥</m:t>
-                        </m:r>
-                      </m:e>
-                      <m:sub>
-                        <m:d>
-                          <m:dPr>
-                            <m:begChr m:val="{"/>
-                            <m:endChr m:val="}"/>
-                            <m:ctrlPr>
-                              <a:rPr lang="en-US" b="0" i="1" smtClean="0">
-                                <a:latin typeface="Cambria Math" panose="02040503050406030204" pitchFamily="18" charset="0"/>
-                              </a:rPr>
-                            </m:ctrlPr>
-                          </m:dPr>
-                          <m:e>
-                            <m:r>
-                              <a:rPr lang="en-US" b="0" i="1" smtClean="0">
-                                <a:latin typeface="Cambria Math" panose="02040503050406030204" pitchFamily="18" charset="0"/>
-                              </a:rPr>
-                              <m:t>𝑖</m:t>
-                            </m:r>
-                            <m:r>
-                              <a:rPr lang="en-US" b="0" i="1" smtClean="0">
-                                <a:latin typeface="Cambria Math" panose="02040503050406030204" pitchFamily="18" charset="0"/>
-                              </a:rPr>
-                              <m:t>+3</m:t>
-                            </m:r>
-                          </m:e>
-                        </m:d>
-                      </m:sub>
-                    </m:sSub>
                     <m:r>
                       <a:rPr lang="en-US" b="0" i="1" smtClean="0">
                         <a:latin typeface="Cambria Math" panose="02040503050406030204" pitchFamily="18" charset="0"/>
                       </a:rPr>
-                      <m:t> …</m:t>
+                      <m:t>𝑁</m:t>
                     </m:r>
                   </m:oMath>
                 </a14:m>
                 <a:r>
-                  <a:rPr lang="en-US" b="0" dirty="0"/>
+                  <a:rPr lang="en-US" dirty="0"/>
                   <a:t> </a:t>
                 </a:r>
               </a:p>
@@ -3737,8 +3608,8 @@
             </p:nvSpPr>
             <p:spPr>
               <a:xfrm>
-                <a:off x="6132226" y="4377125"/>
-                <a:ext cx="2062397" cy="389337"/>
+                <a:off x="3766016" y="4385147"/>
+                <a:ext cx="2062397" cy="369332"/>
               </a:xfrm>
               <a:prstGeom prst="rect">
                 <a:avLst/>
@@ -3746,7 +3617,7 @@
               <a:blipFill>
                 <a:blip r:embed="rId3"/>
                 <a:stretch>
-                  <a:fillRect r="-6707" b="-9375"/>
+                  <a:fillRect/>
                 </a:stretch>
               </a:blipFill>
             </p:spPr>
@@ -3779,7 +3650,7 @@
         </p:nvSpPr>
         <p:spPr>
           <a:xfrm>
-            <a:off x="7538178" y="3940629"/>
+            <a:off x="5099779" y="3940630"/>
             <a:ext cx="286687" cy="436497"/>
           </a:xfrm>
           <a:prstGeom prst="triangle">
@@ -3826,7 +3697,7 @@
         </p:nvSpPr>
         <p:spPr>
           <a:xfrm>
-            <a:off x="6956684" y="3980880"/>
+            <a:off x="4518285" y="3980881"/>
             <a:ext cx="286687" cy="436497"/>
           </a:xfrm>
           <a:prstGeom prst="triangle">
@@ -3873,7 +3744,7 @@
         </p:nvSpPr>
         <p:spPr>
           <a:xfrm>
-            <a:off x="6375190" y="3980880"/>
+            <a:off x="3936791" y="3980881"/>
             <a:ext cx="286687" cy="436497"/>
           </a:xfrm>
           <a:prstGeom prst="triangle">
@@ -3923,7 +3794,7 @@
         </p:nvCxnSpPr>
         <p:spPr>
           <a:xfrm rot="5400000" flipH="1" flipV="1">
-            <a:off x="6019729" y="3977782"/>
+            <a:off x="3581329" y="3977782"/>
             <a:ext cx="205786" cy="648480"/>
           </a:xfrm>
           <a:prstGeom prst="bentConnector2">
@@ -3965,7 +3836,7 @@
         </p:nvCxnSpPr>
         <p:spPr>
           <a:xfrm rot="16200000" flipV="1">
-            <a:off x="5393436" y="3999969"/>
+            <a:off x="2955036" y="3999969"/>
             <a:ext cx="218248" cy="591644"/>
           </a:xfrm>
           <a:prstGeom prst="bentConnector2">
@@ -4004,7 +3875,7 @@
         </p:nvSpPr>
         <p:spPr>
           <a:xfrm>
-            <a:off x="7538178" y="2669154"/>
+            <a:off x="5099779" y="2669155"/>
             <a:ext cx="286687" cy="436497"/>
           </a:xfrm>
           <a:prstGeom prst="triangle">
@@ -4048,7 +3919,7 @@
         </p:nvSpPr>
         <p:spPr>
           <a:xfrm>
-            <a:off x="6956683" y="2666545"/>
+            <a:off x="4518284" y="2666546"/>
             <a:ext cx="286687" cy="436497"/>
           </a:xfrm>
           <a:prstGeom prst="triangle">
@@ -4092,7 +3963,7 @@
         </p:nvSpPr>
         <p:spPr>
           <a:xfrm>
-            <a:off x="6375190" y="2663148"/>
+            <a:off x="3936791" y="2663149"/>
             <a:ext cx="286687" cy="436497"/>
           </a:xfrm>
           <a:prstGeom prst="triangle">
@@ -4122,8 +3993,8 @@
           </a:p>
         </p:txBody>
       </p:sp>
-      <mc:AlternateContent xmlns:mc="http://schemas.openxmlformats.org/markup-compatibility/2006">
-        <mc:Choice xmlns:a14="http://schemas.microsoft.com/office/drawing/2010/main" Requires="a14">
+      <mc:AlternateContent xmlns:mc="http://schemas.openxmlformats.org/markup-compatibility/2006" xmlns:a14="http://schemas.microsoft.com/office/drawing/2010/main">
+        <mc:Choice Requires="a14">
           <p:sp>
             <p:nvSpPr>
               <p:cNvPr id="71" name="TextBox 70">
@@ -4138,7 +4009,7 @@
             </p:nvSpPr>
             <p:spPr>
               <a:xfrm>
-                <a:off x="6192186" y="2266936"/>
+                <a:off x="3753787" y="2266937"/>
                 <a:ext cx="2062397" cy="389337"/>
               </a:xfrm>
               <a:prstGeom prst="rect">
@@ -4155,7 +4026,7 @@
                 <a14:m>
                   <m:oMath xmlns:m="http://schemas.openxmlformats.org/officeDocument/2006/math">
                     <m:r>
-                      <a:rPr lang="en-US" b="0" i="1" smtClean="0">
+                      <a:rPr lang="en-US" i="1">
                         <a:latin typeface="Cambria Math" panose="02040503050406030204" pitchFamily="18" charset="0"/>
                       </a:rPr>
                       <m:t> </m:t>
@@ -4163,14 +4034,14 @@
                     <m:sSub>
                       <m:sSubPr>
                         <m:ctrlPr>
-                          <a:rPr lang="en-US" b="0" i="1" smtClean="0">
+                          <a:rPr lang="en-US" i="1">
                             <a:latin typeface="Cambria Math" panose="02040503050406030204" pitchFamily="18" charset="0"/>
                           </a:rPr>
                         </m:ctrlPr>
                       </m:sSubPr>
                       <m:e>
                         <m:r>
-                          <a:rPr lang="en-US" b="0" i="1" smtClean="0">
+                          <a:rPr lang="en-US" i="1">
                             <a:latin typeface="Cambria Math" panose="02040503050406030204" pitchFamily="18" charset="0"/>
                           </a:rPr>
                           <m:t>𝑦</m:t>
@@ -4182,14 +4053,14 @@
                             <m:begChr m:val="{"/>
                             <m:endChr m:val="}"/>
                             <m:ctrlPr>
-                              <a:rPr lang="en-US" b="0" i="1" smtClean="0">
+                              <a:rPr lang="en-US" i="1">
                                 <a:latin typeface="Cambria Math" panose="02040503050406030204" pitchFamily="18" charset="0"/>
                               </a:rPr>
                             </m:ctrlPr>
                           </m:dPr>
                           <m:e>
                             <m:r>
-                              <a:rPr lang="en-US" b="0" i="1" smtClean="0">
+                              <a:rPr lang="en-US" i="1">
                                 <a:latin typeface="Cambria Math" panose="02040503050406030204" pitchFamily="18" charset="0"/>
                               </a:rPr>
                               <m:t>0</m:t>
@@ -4199,7 +4070,7 @@
                       </m:sub>
                     </m:sSub>
                     <m:r>
-                      <a:rPr lang="en-US" b="0" i="1" smtClean="0">
+                      <a:rPr lang="en-US" i="1">
                         <a:latin typeface="Cambria Math" panose="02040503050406030204" pitchFamily="18" charset="0"/>
                       </a:rPr>
                       <m:t>     </m:t>
@@ -4207,14 +4078,14 @@
                     <m:sSub>
                       <m:sSubPr>
                         <m:ctrlPr>
-                          <a:rPr lang="en-US" b="0" i="1" smtClean="0">
+                          <a:rPr lang="en-US" i="1">
                             <a:latin typeface="Cambria Math" panose="02040503050406030204" pitchFamily="18" charset="0"/>
                           </a:rPr>
                         </m:ctrlPr>
                       </m:sSubPr>
                       <m:e>
                         <m:r>
-                          <a:rPr lang="en-US" b="0" i="1" smtClean="0">
+                          <a:rPr lang="en-US" i="1">
                             <a:latin typeface="Cambria Math" panose="02040503050406030204" pitchFamily="18" charset="0"/>
                           </a:rPr>
                           <m:t>𝑦</m:t>
@@ -4226,14 +4097,14 @@
                             <m:begChr m:val="{"/>
                             <m:endChr m:val="}"/>
                             <m:ctrlPr>
-                              <a:rPr lang="en-US" b="0" i="1" smtClean="0">
+                              <a:rPr lang="en-US" i="1">
                                 <a:latin typeface="Cambria Math" panose="02040503050406030204" pitchFamily="18" charset="0"/>
                               </a:rPr>
                             </m:ctrlPr>
                           </m:dPr>
                           <m:e>
                             <m:r>
-                              <a:rPr lang="en-US" b="0" i="1" smtClean="0">
+                              <a:rPr lang="en-US" i="1">
                                 <a:latin typeface="Cambria Math" panose="02040503050406030204" pitchFamily="18" charset="0"/>
                               </a:rPr>
                               <m:t>1</m:t>
@@ -4243,7 +4114,7 @@
                       </m:sub>
                     </m:sSub>
                     <m:r>
-                      <a:rPr lang="en-US" b="0" i="1" smtClean="0">
+                      <a:rPr lang="en-US" i="1">
                         <a:latin typeface="Cambria Math" panose="02040503050406030204" pitchFamily="18" charset="0"/>
                       </a:rPr>
                       <m:t>  </m:t>
@@ -4251,20 +4122,20 @@
                     <m:sSub>
                       <m:sSubPr>
                         <m:ctrlPr>
-                          <a:rPr lang="en-US" b="0" i="1" smtClean="0">
+                          <a:rPr lang="en-US" i="1">
                             <a:latin typeface="Cambria Math" panose="02040503050406030204" pitchFamily="18" charset="0"/>
                           </a:rPr>
                         </m:ctrlPr>
                       </m:sSubPr>
                       <m:e>
                         <m:r>
-                          <a:rPr lang="en-US" b="0" i="1" smtClean="0">
+                          <a:rPr lang="en-US" i="1">
                             <a:latin typeface="Cambria Math" panose="02040503050406030204" pitchFamily="18" charset="0"/>
                           </a:rPr>
                           <m:t>   </m:t>
                         </m:r>
                         <m:r>
-                          <a:rPr lang="en-US" b="0" i="1" smtClean="0">
+                          <a:rPr lang="en-US" i="1">
                             <a:latin typeface="Cambria Math" panose="02040503050406030204" pitchFamily="18" charset="0"/>
                           </a:rPr>
                           <m:t>𝑦</m:t>
@@ -4276,14 +4147,14 @@
                             <m:begChr m:val="{"/>
                             <m:endChr m:val="}"/>
                             <m:ctrlPr>
-                              <a:rPr lang="en-US" b="0" i="1" smtClean="0">
+                              <a:rPr lang="en-US" i="1">
                                 <a:latin typeface="Cambria Math" panose="02040503050406030204" pitchFamily="18" charset="0"/>
                               </a:rPr>
                             </m:ctrlPr>
                           </m:dPr>
                           <m:e>
                             <m:r>
-                              <a:rPr lang="en-US" b="0" i="1" smtClean="0">
+                              <a:rPr lang="en-US" i="1">
                                 <a:latin typeface="Cambria Math" panose="02040503050406030204" pitchFamily="18" charset="0"/>
                               </a:rPr>
                               <m:t>2</m:t>
@@ -4293,7 +4164,7 @@
                       </m:sub>
                     </m:sSub>
                     <m:r>
-                      <a:rPr lang="en-US" b="0" i="1" smtClean="0">
+                      <a:rPr lang="en-US" i="1">
                         <a:latin typeface="Cambria Math" panose="02040503050406030204" pitchFamily="18" charset="0"/>
                       </a:rPr>
                       <m:t> …</m:t>
@@ -4301,14 +4172,14 @@
                   </m:oMath>
                 </a14:m>
                 <a:r>
-                  <a:rPr lang="en-US" b="0" dirty="0"/>
+                  <a:rPr lang="en-US" dirty="0"/>
                   <a:t> </a:t>
                 </a:r>
               </a:p>
             </p:txBody>
           </p:sp>
         </mc:Choice>
-        <mc:Fallback>
+        <mc:Fallback xmlns="">
           <p:sp>
             <p:nvSpPr>
               <p:cNvPr id="71" name="TextBox 70">
@@ -4325,7 +4196,7 @@
             </p:nvSpPr>
             <p:spPr>
               <a:xfrm>
-                <a:off x="6192186" y="2266936"/>
+                <a:off x="3753787" y="2266937"/>
                 <a:ext cx="2062397" cy="389337"/>
               </a:xfrm>
               <a:prstGeom prst="rect">
@@ -4353,8 +4224,8 @@
           </p:sp>
         </mc:Fallback>
       </mc:AlternateContent>
-      <mc:AlternateContent xmlns:mc="http://schemas.openxmlformats.org/markup-compatibility/2006">
-        <mc:Choice xmlns:a14="http://schemas.microsoft.com/office/drawing/2010/main" Requires="a14">
+      <mc:AlternateContent xmlns:mc="http://schemas.openxmlformats.org/markup-compatibility/2006" xmlns:a14="http://schemas.microsoft.com/office/drawing/2010/main">
+        <mc:Choice Requires="a14">
           <p:sp>
             <p:nvSpPr>
               <p:cNvPr id="73" name="TextBox 72">
@@ -4369,7 +4240,7 @@
             </p:nvSpPr>
             <p:spPr>
               <a:xfrm>
-                <a:off x="3424627" y="1844561"/>
+                <a:off x="986228" y="1844562"/>
                 <a:ext cx="2062397" cy="389337"/>
               </a:xfrm>
               <a:prstGeom prst="rect">
@@ -4386,7 +4257,7 @@
                 <a14:m>
                   <m:oMath xmlns:m="http://schemas.openxmlformats.org/officeDocument/2006/math">
                     <m:r>
-                      <a:rPr lang="en-US" b="0" i="1" smtClean="0">
+                      <a:rPr lang="en-US" i="1">
                         <a:latin typeface="Cambria Math" panose="02040503050406030204" pitchFamily="18" charset="0"/>
                       </a:rPr>
                       <m:t>….</m:t>
@@ -4394,14 +4265,14 @@
                     <m:sSub>
                       <m:sSubPr>
                         <m:ctrlPr>
-                          <a:rPr lang="en-US" b="0" i="1" smtClean="0">
+                          <a:rPr lang="en-US" i="1">
                             <a:latin typeface="Cambria Math" panose="02040503050406030204" pitchFamily="18" charset="0"/>
                           </a:rPr>
                         </m:ctrlPr>
                       </m:sSubPr>
                       <m:e>
                         <m:r>
-                          <a:rPr lang="en-US" b="0" i="1" smtClean="0">
+                          <a:rPr lang="en-US" i="1">
                             <a:latin typeface="Cambria Math" panose="02040503050406030204" pitchFamily="18" charset="0"/>
                           </a:rPr>
                           <m:t>𝑥</m:t>
@@ -4413,20 +4284,20 @@
                             <m:begChr m:val="{"/>
                             <m:endChr m:val="}"/>
                             <m:ctrlPr>
-                              <a:rPr lang="en-US" b="0" i="1" smtClean="0">
+                              <a:rPr lang="en-US" i="1">
                                 <a:latin typeface="Cambria Math" panose="02040503050406030204" pitchFamily="18" charset="0"/>
                               </a:rPr>
                             </m:ctrlPr>
                           </m:dPr>
                           <m:e>
                             <m:r>
-                              <a:rPr lang="en-US" b="0" i="1" smtClean="0">
+                              <a:rPr lang="en-US" i="1">
                                 <a:latin typeface="Cambria Math" panose="02040503050406030204" pitchFamily="18" charset="0"/>
                               </a:rPr>
                               <m:t>𝑖</m:t>
                             </m:r>
                             <m:r>
-                              <a:rPr lang="en-US" b="0" i="1" smtClean="0">
+                              <a:rPr lang="en-US" i="1">
                                 <a:latin typeface="Cambria Math" panose="02040503050406030204" pitchFamily="18" charset="0"/>
                               </a:rPr>
                               <m:t>−2</m:t>
@@ -4436,7 +4307,7 @@
                       </m:sub>
                     </m:sSub>
                     <m:r>
-                      <a:rPr lang="en-US" b="0" i="1" smtClean="0">
+                      <a:rPr lang="en-US" i="1">
                         <a:latin typeface="Cambria Math" panose="02040503050406030204" pitchFamily="18" charset="0"/>
                       </a:rPr>
                       <m:t>  </m:t>
@@ -4444,14 +4315,14 @@
                     <m:sSub>
                       <m:sSubPr>
                         <m:ctrlPr>
-                          <a:rPr lang="en-US" b="0" i="1" smtClean="0">
+                          <a:rPr lang="en-US" i="1">
                             <a:latin typeface="Cambria Math" panose="02040503050406030204" pitchFamily="18" charset="0"/>
                           </a:rPr>
                         </m:ctrlPr>
                       </m:sSubPr>
                       <m:e>
                         <m:r>
-                          <a:rPr lang="en-US" b="0" i="1" smtClean="0">
+                          <a:rPr lang="en-US" i="1">
                             <a:latin typeface="Cambria Math" panose="02040503050406030204" pitchFamily="18" charset="0"/>
                           </a:rPr>
                           <m:t>𝑥</m:t>
@@ -4463,20 +4334,20 @@
                             <m:begChr m:val="{"/>
                             <m:endChr m:val="}"/>
                             <m:ctrlPr>
-                              <a:rPr lang="en-US" b="0" i="1" smtClean="0">
+                              <a:rPr lang="en-US" i="1">
                                 <a:latin typeface="Cambria Math" panose="02040503050406030204" pitchFamily="18" charset="0"/>
                               </a:rPr>
                             </m:ctrlPr>
                           </m:dPr>
                           <m:e>
                             <m:r>
-                              <a:rPr lang="en-US" b="0" i="1" smtClean="0">
+                              <a:rPr lang="en-US" i="1">
                                 <a:latin typeface="Cambria Math" panose="02040503050406030204" pitchFamily="18" charset="0"/>
                               </a:rPr>
                               <m:t>𝑖</m:t>
                             </m:r>
                             <m:r>
-                              <a:rPr lang="en-US" b="0" i="1" smtClean="0">
+                              <a:rPr lang="en-US" i="1">
                                 <a:latin typeface="Cambria Math" panose="02040503050406030204" pitchFamily="18" charset="0"/>
                               </a:rPr>
                               <m:t>−1</m:t>
@@ -4486,7 +4357,7 @@
                       </m:sub>
                     </m:sSub>
                     <m:r>
-                      <a:rPr lang="en-US" b="0" i="1" smtClean="0">
+                      <a:rPr lang="en-US" i="1">
                         <a:latin typeface="Cambria Math" panose="02040503050406030204" pitchFamily="18" charset="0"/>
                       </a:rPr>
                       <m:t>  </m:t>
@@ -4494,14 +4365,14 @@
                     <m:sSub>
                       <m:sSubPr>
                         <m:ctrlPr>
-                          <a:rPr lang="en-US" b="0" i="1" smtClean="0">
+                          <a:rPr lang="en-US" i="1">
                             <a:latin typeface="Cambria Math" panose="02040503050406030204" pitchFamily="18" charset="0"/>
                           </a:rPr>
                         </m:ctrlPr>
                       </m:sSubPr>
                       <m:e>
                         <m:r>
-                          <a:rPr lang="en-US" b="0" i="1" smtClean="0">
+                          <a:rPr lang="en-US" i="1">
                             <a:latin typeface="Cambria Math" panose="02040503050406030204" pitchFamily="18" charset="0"/>
                           </a:rPr>
                           <m:t>𝑥</m:t>
@@ -4513,14 +4384,14 @@
                             <m:begChr m:val="{"/>
                             <m:endChr m:val="}"/>
                             <m:ctrlPr>
-                              <a:rPr lang="en-US" b="0" i="1" smtClean="0">
+                              <a:rPr lang="en-US" i="1">
                                 <a:latin typeface="Cambria Math" panose="02040503050406030204" pitchFamily="18" charset="0"/>
                               </a:rPr>
                             </m:ctrlPr>
                           </m:dPr>
                           <m:e>
                             <m:r>
-                              <a:rPr lang="en-US" b="0" i="1" smtClean="0">
+                              <a:rPr lang="en-US" i="1">
                                 <a:latin typeface="Cambria Math" panose="02040503050406030204" pitchFamily="18" charset="0"/>
                               </a:rPr>
                               <m:t>𝑖</m:t>
@@ -4532,14 +4403,14 @@
                   </m:oMath>
                 </a14:m>
                 <a:r>
-                  <a:rPr lang="en-US" b="0" dirty="0"/>
+                  <a:rPr lang="en-US" dirty="0"/>
                   <a:t> </a:t>
                 </a:r>
               </a:p>
             </p:txBody>
           </p:sp>
         </mc:Choice>
-        <mc:Fallback>
+        <mc:Fallback xmlns="">
           <p:sp>
             <p:nvSpPr>
               <p:cNvPr id="73" name="TextBox 72">
@@ -4556,7 +4427,7 @@
             </p:nvSpPr>
             <p:spPr>
               <a:xfrm>
-                <a:off x="3424627" y="1844561"/>
+                <a:off x="986228" y="1844562"/>
                 <a:ext cx="2062397" cy="389337"/>
               </a:xfrm>
               <a:prstGeom prst="rect">
@@ -4598,7 +4469,7 @@
         </p:nvSpPr>
         <p:spPr>
           <a:xfrm>
-            <a:off x="5051683" y="1435853"/>
+            <a:off x="2613284" y="1435854"/>
             <a:ext cx="286687" cy="436497"/>
           </a:xfrm>
           <a:prstGeom prst="triangle">
@@ -4645,7 +4516,7 @@
         </p:nvSpPr>
         <p:spPr>
           <a:xfrm>
-            <a:off x="4470189" y="1476104"/>
+            <a:off x="2031790" y="1476105"/>
             <a:ext cx="286687" cy="436497"/>
           </a:xfrm>
           <a:prstGeom prst="triangle">
@@ -4692,7 +4563,7 @@
         </p:nvSpPr>
         <p:spPr>
           <a:xfrm>
-            <a:off x="3888695" y="1476104"/>
+            <a:off x="1450296" y="1476105"/>
             <a:ext cx="286687" cy="436497"/>
           </a:xfrm>
           <a:prstGeom prst="triangle">
@@ -4739,7 +4610,7 @@
         </p:nvSpPr>
         <p:spPr>
           <a:xfrm>
-            <a:off x="5714998" y="1872350"/>
+            <a:off x="3276599" y="1872351"/>
             <a:ext cx="286687" cy="389337"/>
           </a:xfrm>
           <a:prstGeom prst="ellipse">
@@ -4788,7 +4659,7 @@
         </p:nvSpPr>
         <p:spPr>
           <a:xfrm>
-            <a:off x="6956684" y="1448315"/>
+            <a:off x="4518285" y="1448316"/>
             <a:ext cx="286687" cy="436497"/>
           </a:xfrm>
           <a:prstGeom prst="triangle">
@@ -4835,7 +4706,7 @@
         </p:nvSpPr>
         <p:spPr>
           <a:xfrm>
-            <a:off x="6375190" y="1448315"/>
+            <a:off x="3936791" y="1448316"/>
             <a:ext cx="286687" cy="436497"/>
           </a:xfrm>
           <a:prstGeom prst="triangle">
@@ -4885,7 +4756,7 @@
         </p:nvCxnSpPr>
         <p:spPr>
           <a:xfrm rot="5400000" flipH="1" flipV="1">
-            <a:off x="6049709" y="1475197"/>
+            <a:off x="3611309" y="1475197"/>
             <a:ext cx="205786" cy="588520"/>
           </a:xfrm>
           <a:prstGeom prst="bentConnector2">
@@ -4927,7 +4798,7 @@
         </p:nvCxnSpPr>
         <p:spPr>
           <a:xfrm rot="16200000" flipV="1">
-            <a:off x="5453396" y="1467404"/>
+            <a:off x="3014996" y="1467404"/>
             <a:ext cx="218248" cy="591644"/>
           </a:xfrm>
           <a:prstGeom prst="bentConnector2">
@@ -4966,7 +4837,7 @@
         </p:nvSpPr>
         <p:spPr>
           <a:xfrm>
-            <a:off x="7523188" y="1435852"/>
+            <a:off x="5084789" y="1435853"/>
             <a:ext cx="286687" cy="436497"/>
           </a:xfrm>
           <a:prstGeom prst="triangle">
@@ -4999,147 +4870,6 @@
           </a:p>
         </p:txBody>
       </p:sp>
-      <p:cxnSp>
-        <p:nvCxnSpPr>
-          <p:cNvPr id="85" name="Elbow Connector 84">
-            <a:extLst>
-              <a:ext uri="{FF2B5EF4-FFF2-40B4-BE49-F238E27FC236}">
-                <a16:creationId xmlns:a16="http://schemas.microsoft.com/office/drawing/2014/main" id="{63A80948-ADE8-8C40-AC7B-FDEECD5F344F}"/>
-              </a:ext>
-            </a:extLst>
-          </p:cNvPr>
-          <p:cNvCxnSpPr>
-            <a:stCxn id="70" idx="0"/>
-            <a:endCxn id="80" idx="3"/>
-          </p:cNvCxnSpPr>
-          <p:nvPr/>
-        </p:nvCxnSpPr>
-        <p:spPr>
-          <a:xfrm rot="5400000" flipH="1" flipV="1">
-            <a:off x="6129366" y="2273980"/>
-            <a:ext cx="778336" cy="12700"/>
-          </a:xfrm>
-          <a:prstGeom prst="bentConnector3">
-            <a:avLst/>
-          </a:prstGeom>
-          <a:ln>
-            <a:solidFill>
-              <a:schemeClr val="bg1">
-                <a:lumMod val="65000"/>
-              </a:schemeClr>
-            </a:solidFill>
-            <a:tailEnd type="triangle"/>
-          </a:ln>
-        </p:spPr>
-        <p:style>
-          <a:lnRef idx="1">
-            <a:schemeClr val="dk1"/>
-          </a:lnRef>
-          <a:fillRef idx="0">
-            <a:schemeClr val="dk1"/>
-          </a:fillRef>
-          <a:effectRef idx="0">
-            <a:schemeClr val="dk1"/>
-          </a:effectRef>
-          <a:fontRef idx="minor">
-            <a:schemeClr val="tx1"/>
-          </a:fontRef>
-        </p:style>
-      </p:cxnSp>
-      <p:cxnSp>
-        <p:nvCxnSpPr>
-          <p:cNvPr id="87" name="Elbow Connector 86">
-            <a:extLst>
-              <a:ext uri="{FF2B5EF4-FFF2-40B4-BE49-F238E27FC236}">
-                <a16:creationId xmlns:a16="http://schemas.microsoft.com/office/drawing/2014/main" id="{BFD4E057-10B5-B441-902A-D3D07DFBE041}"/>
-              </a:ext>
-            </a:extLst>
-          </p:cNvPr>
-          <p:cNvCxnSpPr>
-            <a:stCxn id="69" idx="0"/>
-            <a:endCxn id="79" idx="3"/>
-          </p:cNvCxnSpPr>
-          <p:nvPr/>
-        </p:nvCxnSpPr>
-        <p:spPr>
-          <a:xfrm rot="5400000" flipH="1" flipV="1">
-            <a:off x="6709161" y="2275679"/>
-            <a:ext cx="781733" cy="1"/>
-          </a:xfrm>
-          <a:prstGeom prst="bentConnector3">
-            <a:avLst/>
-          </a:prstGeom>
-          <a:ln>
-            <a:solidFill>
-              <a:schemeClr val="bg1">
-                <a:lumMod val="65000"/>
-              </a:schemeClr>
-            </a:solidFill>
-            <a:tailEnd type="triangle"/>
-          </a:ln>
-        </p:spPr>
-        <p:style>
-          <a:lnRef idx="1">
-            <a:schemeClr val="dk1"/>
-          </a:lnRef>
-          <a:fillRef idx="0">
-            <a:schemeClr val="dk1"/>
-          </a:fillRef>
-          <a:effectRef idx="0">
-            <a:schemeClr val="dk1"/>
-          </a:effectRef>
-          <a:fontRef idx="minor">
-            <a:schemeClr val="tx1"/>
-          </a:fontRef>
-        </p:style>
-      </p:cxnSp>
-      <p:cxnSp>
-        <p:nvCxnSpPr>
-          <p:cNvPr id="89" name="Elbow Connector 88">
-            <a:extLst>
-              <a:ext uri="{FF2B5EF4-FFF2-40B4-BE49-F238E27FC236}">
-                <a16:creationId xmlns:a16="http://schemas.microsoft.com/office/drawing/2014/main" id="{31A5A8D2-E59C-F743-BE14-952749F88306}"/>
-              </a:ext>
-            </a:extLst>
-          </p:cNvPr>
-          <p:cNvCxnSpPr>
-            <a:stCxn id="68" idx="0"/>
-            <a:endCxn id="83" idx="3"/>
-          </p:cNvCxnSpPr>
-          <p:nvPr/>
-        </p:nvCxnSpPr>
-        <p:spPr>
-          <a:xfrm rot="16200000" flipV="1">
-            <a:off x="7275625" y="2263257"/>
-            <a:ext cx="796805" cy="14990"/>
-          </a:xfrm>
-          <a:prstGeom prst="bentConnector3">
-            <a:avLst/>
-          </a:prstGeom>
-          <a:ln>
-            <a:solidFill>
-              <a:schemeClr val="bg1">
-                <a:lumMod val="65000"/>
-              </a:schemeClr>
-            </a:solidFill>
-            <a:tailEnd type="triangle"/>
-          </a:ln>
-        </p:spPr>
-        <p:style>
-          <a:lnRef idx="1">
-            <a:schemeClr val="dk1"/>
-          </a:lnRef>
-          <a:fillRef idx="0">
-            <a:schemeClr val="dk1"/>
-          </a:fillRef>
-          <a:effectRef idx="0">
-            <a:schemeClr val="dk1"/>
-          </a:effectRef>
-          <a:fontRef idx="minor">
-            <a:schemeClr val="tx1"/>
-          </a:fontRef>
-        </p:style>
-      </p:cxnSp>
       <p:sp>
         <p:nvSpPr>
           <p:cNvPr id="90" name="Triangle 89">
@@ -5154,7 +4884,7 @@
         </p:nvSpPr>
         <p:spPr>
           <a:xfrm>
-            <a:off x="7458852" y="196092"/>
+            <a:off x="5020453" y="196093"/>
             <a:ext cx="286687" cy="436497"/>
           </a:xfrm>
           <a:prstGeom prst="triangle">
@@ -5198,7 +4928,7 @@
         </p:nvSpPr>
         <p:spPr>
           <a:xfrm>
-            <a:off x="3176667" y="612463"/>
+            <a:off x="738267" y="612464"/>
             <a:ext cx="5453920" cy="827315"/>
           </a:xfrm>
           <a:prstGeom prst="rect">
@@ -5245,7 +4975,7 @@
         </p:nvSpPr>
         <p:spPr>
           <a:xfrm>
-            <a:off x="6425095" y="257046"/>
+            <a:off x="3986695" y="257046"/>
             <a:ext cx="1063176" cy="369332"/>
           </a:xfrm>
           <a:prstGeom prst="rect">
@@ -5280,7 +5010,7 @@
         </p:nvSpPr>
         <p:spPr>
           <a:xfrm>
-            <a:off x="2968052" y="104931"/>
+            <a:off x="529653" y="104931"/>
             <a:ext cx="5906125" cy="2203554"/>
           </a:xfrm>
           <a:prstGeom prst="roundRect">
@@ -5325,7 +5055,7 @@
         </p:nvSpPr>
         <p:spPr>
           <a:xfrm rot="5400000">
-            <a:off x="8377642" y="1022042"/>
+            <a:off x="5939242" y="1022042"/>
             <a:ext cx="1445076" cy="369332"/>
           </a:xfrm>
           <a:prstGeom prst="rect">
@@ -5361,7 +5091,7 @@
         </p:nvSpPr>
         <p:spPr>
           <a:xfrm>
-            <a:off x="2968052" y="2369439"/>
+            <a:off x="529653" y="2369440"/>
             <a:ext cx="5906125" cy="2532345"/>
           </a:xfrm>
           <a:prstGeom prst="roundRect">
@@ -5406,7 +5136,7 @@
         </p:nvSpPr>
         <p:spPr>
           <a:xfrm rot="5400000">
-            <a:off x="8269832" y="3477752"/>
+            <a:off x="5831433" y="3477752"/>
             <a:ext cx="1660695" cy="369332"/>
           </a:xfrm>
           <a:prstGeom prst="rect">
@@ -5428,6 +5158,267 @@
           </a:p>
         </p:txBody>
       </p:sp>
+      <p:cxnSp>
+        <p:nvCxnSpPr>
+          <p:cNvPr id="3" name="Elbow Connector 2">
+            <a:extLst>
+              <a:ext uri="{FF2B5EF4-FFF2-40B4-BE49-F238E27FC236}">
+                <a16:creationId xmlns:a16="http://schemas.microsoft.com/office/drawing/2014/main" id="{9B13308C-92B7-CC47-A7D8-C458677DC379}"/>
+              </a:ext>
+            </a:extLst>
+          </p:cNvPr>
+          <p:cNvCxnSpPr>
+            <a:stCxn id="70" idx="0"/>
+            <a:endCxn id="27" idx="3"/>
+          </p:cNvCxnSpPr>
+          <p:nvPr/>
+        </p:nvCxnSpPr>
+        <p:spPr>
+          <a:xfrm rot="16200000" flipH="1">
+            <a:off x="3493767" y="3249516"/>
+            <a:ext cx="1754229" cy="581494"/>
+          </a:xfrm>
+          <a:prstGeom prst="bentConnector5">
+            <a:avLst>
+              <a:gd name="adj1" fmla="val -13031"/>
+              <a:gd name="adj2" fmla="val 50000"/>
+              <a:gd name="adj3" fmla="val 113031"/>
+            </a:avLst>
+          </a:prstGeom>
+          <a:ln>
+            <a:tailEnd type="triangle"/>
+          </a:ln>
+        </p:spPr>
+        <p:style>
+          <a:lnRef idx="1">
+            <a:schemeClr val="dk1"/>
+          </a:lnRef>
+          <a:fillRef idx="0">
+            <a:schemeClr val="dk1"/>
+          </a:fillRef>
+          <a:effectRef idx="0">
+            <a:schemeClr val="dk1"/>
+          </a:effectRef>
+          <a:fontRef idx="minor">
+            <a:schemeClr val="tx1"/>
+          </a:fontRef>
+        </p:style>
+      </p:cxnSp>
+      <p:cxnSp>
+        <p:nvCxnSpPr>
+          <p:cNvPr id="12" name="Elbow Connector 11">
+            <a:extLst>
+              <a:ext uri="{FF2B5EF4-FFF2-40B4-BE49-F238E27FC236}">
+                <a16:creationId xmlns:a16="http://schemas.microsoft.com/office/drawing/2014/main" id="{0B7016B7-B673-B141-A5CC-386986735BBB}"/>
+              </a:ext>
+            </a:extLst>
+          </p:cNvPr>
+          <p:cNvCxnSpPr>
+            <a:stCxn id="69" idx="0"/>
+            <a:endCxn id="26" idx="3"/>
+          </p:cNvCxnSpPr>
+          <p:nvPr/>
+        </p:nvCxnSpPr>
+        <p:spPr>
+          <a:xfrm rot="16200000" flipH="1">
+            <a:off x="4097084" y="3231089"/>
+            <a:ext cx="1710581" cy="581495"/>
+          </a:xfrm>
+          <a:prstGeom prst="bentConnector5">
+            <a:avLst>
+              <a:gd name="adj1" fmla="val -13364"/>
+              <a:gd name="adj2" fmla="val 50000"/>
+              <a:gd name="adj3" fmla="val 113364"/>
+            </a:avLst>
+          </a:prstGeom>
+          <a:ln>
+            <a:tailEnd type="triangle"/>
+          </a:ln>
+        </p:spPr>
+        <p:style>
+          <a:lnRef idx="1">
+            <a:schemeClr val="dk1"/>
+          </a:lnRef>
+          <a:fillRef idx="0">
+            <a:schemeClr val="dk1"/>
+          </a:fillRef>
+          <a:effectRef idx="0">
+            <a:schemeClr val="dk1"/>
+          </a:effectRef>
+          <a:fontRef idx="minor">
+            <a:schemeClr val="tx1"/>
+          </a:fontRef>
+        </p:style>
+      </p:cxnSp>
+      <p:cxnSp>
+        <p:nvCxnSpPr>
+          <p:cNvPr id="18" name="Elbow Connector 17">
+            <a:extLst>
+              <a:ext uri="{FF2B5EF4-FFF2-40B4-BE49-F238E27FC236}">
+                <a16:creationId xmlns:a16="http://schemas.microsoft.com/office/drawing/2014/main" id="{5D4CAD04-ADA2-1347-98C9-BFD500CA711B}"/>
+              </a:ext>
+            </a:extLst>
+          </p:cNvPr>
+          <p:cNvCxnSpPr>
+            <a:stCxn id="68" idx="0"/>
+          </p:cNvCxnSpPr>
+          <p:nvPr/>
+        </p:nvCxnSpPr>
+        <p:spPr>
+          <a:xfrm rot="16200000" flipH="1">
+            <a:off x="4536913" y="3375365"/>
+            <a:ext cx="1776012" cy="363593"/>
+          </a:xfrm>
+          <a:prstGeom prst="bentConnector3">
+            <a:avLst>
+              <a:gd name="adj1" fmla="val -12872"/>
+            </a:avLst>
+          </a:prstGeom>
+          <a:ln>
+            <a:tailEnd type="triangle"/>
+          </a:ln>
+        </p:spPr>
+        <p:style>
+          <a:lnRef idx="1">
+            <a:schemeClr val="dk1"/>
+          </a:lnRef>
+          <a:fillRef idx="0">
+            <a:schemeClr val="dk1"/>
+          </a:fillRef>
+          <a:effectRef idx="0">
+            <a:schemeClr val="dk1"/>
+          </a:effectRef>
+          <a:fontRef idx="minor">
+            <a:schemeClr val="tx1"/>
+          </a:fontRef>
+        </p:style>
+      </p:cxnSp>
+      <p:cxnSp>
+        <p:nvCxnSpPr>
+          <p:cNvPr id="20" name="Elbow Connector 19">
+            <a:extLst>
+              <a:ext uri="{FF2B5EF4-FFF2-40B4-BE49-F238E27FC236}">
+                <a16:creationId xmlns:a16="http://schemas.microsoft.com/office/drawing/2014/main" id="{374B16BA-5D88-B845-8D45-CDB3F95B71B8}"/>
+              </a:ext>
+            </a:extLst>
+          </p:cNvPr>
+          <p:cNvCxnSpPr>
+            <a:stCxn id="70" idx="0"/>
+            <a:endCxn id="80" idx="3"/>
+          </p:cNvCxnSpPr>
+          <p:nvPr/>
+        </p:nvCxnSpPr>
+        <p:spPr>
+          <a:xfrm rot="5400000" flipH="1" flipV="1">
+            <a:off x="3690967" y="2273981"/>
+            <a:ext cx="778336" cy="12700"/>
+          </a:xfrm>
+          <a:prstGeom prst="bentConnector3">
+            <a:avLst/>
+          </a:prstGeom>
+          <a:ln>
+            <a:tailEnd type="triangle"/>
+          </a:ln>
+        </p:spPr>
+        <p:style>
+          <a:lnRef idx="1">
+            <a:schemeClr val="dk1"/>
+          </a:lnRef>
+          <a:fillRef idx="0">
+            <a:schemeClr val="dk1"/>
+          </a:fillRef>
+          <a:effectRef idx="0">
+            <a:schemeClr val="dk1"/>
+          </a:effectRef>
+          <a:fontRef idx="minor">
+            <a:schemeClr val="tx1"/>
+          </a:fontRef>
+        </p:style>
+      </p:cxnSp>
+      <p:cxnSp>
+        <p:nvCxnSpPr>
+          <p:cNvPr id="22" name="Elbow Connector 21">
+            <a:extLst>
+              <a:ext uri="{FF2B5EF4-FFF2-40B4-BE49-F238E27FC236}">
+                <a16:creationId xmlns:a16="http://schemas.microsoft.com/office/drawing/2014/main" id="{8C976FD2-882A-B842-B7F7-C0A5FEF5B6EB}"/>
+              </a:ext>
+            </a:extLst>
+          </p:cNvPr>
+          <p:cNvCxnSpPr>
+            <a:stCxn id="69" idx="0"/>
+            <a:endCxn id="79" idx="3"/>
+          </p:cNvCxnSpPr>
+          <p:nvPr/>
+        </p:nvCxnSpPr>
+        <p:spPr>
+          <a:xfrm rot="5400000" flipH="1" flipV="1">
+            <a:off x="4270762" y="2275680"/>
+            <a:ext cx="781733" cy="1"/>
+          </a:xfrm>
+          <a:prstGeom prst="bentConnector3">
+            <a:avLst/>
+          </a:prstGeom>
+          <a:ln>
+            <a:tailEnd type="triangle"/>
+          </a:ln>
+        </p:spPr>
+        <p:style>
+          <a:lnRef idx="1">
+            <a:schemeClr val="dk1"/>
+          </a:lnRef>
+          <a:fillRef idx="0">
+            <a:schemeClr val="dk1"/>
+          </a:fillRef>
+          <a:effectRef idx="0">
+            <a:schemeClr val="dk1"/>
+          </a:effectRef>
+          <a:fontRef idx="minor">
+            <a:schemeClr val="tx1"/>
+          </a:fontRef>
+        </p:style>
+      </p:cxnSp>
+      <p:cxnSp>
+        <p:nvCxnSpPr>
+          <p:cNvPr id="29" name="Elbow Connector 28">
+            <a:extLst>
+              <a:ext uri="{FF2B5EF4-FFF2-40B4-BE49-F238E27FC236}">
+                <a16:creationId xmlns:a16="http://schemas.microsoft.com/office/drawing/2014/main" id="{11C4CD3A-9FA7-ED4C-8614-6285BA3B24D6}"/>
+              </a:ext>
+            </a:extLst>
+          </p:cNvPr>
+          <p:cNvCxnSpPr>
+            <a:stCxn id="68" idx="0"/>
+            <a:endCxn id="83" idx="3"/>
+          </p:cNvCxnSpPr>
+          <p:nvPr/>
+        </p:nvCxnSpPr>
+        <p:spPr>
+          <a:xfrm rot="16200000" flipV="1">
+            <a:off x="4837226" y="2263258"/>
+            <a:ext cx="796805" cy="14990"/>
+          </a:xfrm>
+          <a:prstGeom prst="bentConnector3">
+            <a:avLst/>
+          </a:prstGeom>
+          <a:ln>
+            <a:tailEnd type="triangle"/>
+          </a:ln>
+        </p:spPr>
+        <p:style>
+          <a:lnRef idx="1">
+            <a:schemeClr val="dk1"/>
+          </a:lnRef>
+          <a:fillRef idx="0">
+            <a:schemeClr val="dk1"/>
+          </a:fillRef>
+          <a:effectRef idx="0">
+            <a:schemeClr val="dk1"/>
+          </a:effectRef>
+          <a:fontRef idx="minor">
+            <a:schemeClr val="tx1"/>
+          </a:fontRef>
+        </p:style>
+      </p:cxnSp>
     </p:spTree>
     <p:extLst>
       <p:ext uri="{BB962C8B-B14F-4D97-AF65-F5344CB8AC3E}">

</xml_diff>